<commit_message>
알고리즘 0328 initial commit
</commit_message>
<xml_diff>
--- a/Backtrack_0321/암호만들기_pt.pptx
+++ b/Backtrack_0321/암호만들기_pt.pptx
@@ -5930,7 +5930,7 @@
           <a:p>
             <a:fld id="{78EAD4AA-0A05-4C71-A2D7-C5FA1014B868}" type="datetimeFigureOut">
               <a:rPr lang="ko-KR" altLang="en-US" smtClean="0"/>
-              <a:t>2022-03-21</a:t>
+              <a:t>2022-03-26</a:t>
             </a:fld>
             <a:endParaRPr lang="ko-KR" altLang="en-US"/>
           </a:p>
@@ -8556,7 +8556,7 @@
           <a:p>
             <a:fld id="{5E7AA473-D82F-4EFF-9DF7-AE6D83C51288}" type="datetime1">
               <a:rPr lang="en-US" smtClean="0"/>
-              <a:t>3/21/2022</a:t>
+              <a:t>3/26/2022</a:t>
             </a:fld>
             <a:endParaRPr lang="en-US"/>
           </a:p>
@@ -8810,7 +8810,7 @@
           <a:p>
             <a:fld id="{1E12F1F0-FE2D-4C1C-B320-8CB9BE735F0F}" type="datetime1">
               <a:rPr lang="en-US" smtClean="0"/>
-              <a:t>3/21/2022</a:t>
+              <a:t>3/26/2022</a:t>
             </a:fld>
             <a:endParaRPr lang="en-US"/>
           </a:p>
@@ -9078,7 +9078,7 @@
           <a:p>
             <a:fld id="{2CF1B96C-10FD-4EBC-9029-9652B7535D02}" type="datetime1">
               <a:rPr lang="en-US" smtClean="0"/>
-              <a:t>3/21/2022</a:t>
+              <a:t>3/26/2022</a:t>
             </a:fld>
             <a:endParaRPr lang="en-US"/>
           </a:p>
@@ -9332,7 +9332,7 @@
           <a:p>
             <a:fld id="{14878474-CC00-4A95-9D50-A41C12D1EEC4}" type="datetime1">
               <a:rPr lang="en-US" smtClean="0"/>
-              <a:t>3/21/2022</a:t>
+              <a:t>3/26/2022</a:t>
             </a:fld>
             <a:endParaRPr lang="en-US"/>
           </a:p>
@@ -9610,7 +9610,7 @@
           <a:p>
             <a:fld id="{7F38C8B4-7FBB-408F-BDB9-F0496874AFB2}" type="datetime1">
               <a:rPr lang="en-US" smtClean="0"/>
-              <a:t>3/21/2022</a:t>
+              <a:t>3/26/2022</a:t>
             </a:fld>
             <a:endParaRPr lang="en-US"/>
           </a:p>
@@ -9882,7 +9882,7 @@
           <a:p>
             <a:fld id="{2BB8EE20-A5E2-47D3-8F6D-A2BA7AB2E093}" type="datetime1">
               <a:rPr lang="en-US" smtClean="0"/>
-              <a:t>3/21/2022</a:t>
+              <a:t>3/26/2022</a:t>
             </a:fld>
             <a:endParaRPr lang="en-US"/>
           </a:p>
@@ -10440,7 +10440,7 @@
           <a:p>
             <a:fld id="{3382CF99-132F-413F-B7EF-71A5C33F2ED6}" type="datetime1">
               <a:rPr lang="en-US" smtClean="0"/>
-              <a:t>3/21/2022</a:t>
+              <a:t>3/26/2022</a:t>
             </a:fld>
             <a:endParaRPr lang="en-US"/>
           </a:p>
@@ -10582,7 +10582,7 @@
           <a:p>
             <a:fld id="{1F17AE06-98E0-4D9F-A059-92C3548821BB}" type="datetime1">
               <a:rPr lang="en-US" smtClean="0"/>
-              <a:t>3/21/2022</a:t>
+              <a:t>3/26/2022</a:t>
             </a:fld>
             <a:endParaRPr lang="en-US"/>
           </a:p>
@@ -10695,7 +10695,7 @@
           <a:p>
             <a:fld id="{FFBA00CA-3DDC-4705-B840-978EF5EA0707}" type="datetime1">
               <a:rPr lang="en-US" smtClean="0"/>
-              <a:t>3/21/2022</a:t>
+              <a:t>3/26/2022</a:t>
             </a:fld>
             <a:endParaRPr lang="en-US"/>
           </a:p>
@@ -11014,7 +11014,7 @@
           <a:p>
             <a:fld id="{FC366D49-0BBA-4C5A-AD96-6448CA63451A}" type="datetime1">
               <a:rPr lang="en-US" smtClean="0"/>
-              <a:t>3/21/2022</a:t>
+              <a:t>3/26/2022</a:t>
             </a:fld>
             <a:endParaRPr lang="en-US"/>
           </a:p>
@@ -11311,7 +11311,7 @@
           <a:p>
             <a:fld id="{4F4EB293-A316-472D-A8B4-6947CF1A12B7}" type="datetime1">
               <a:rPr lang="en-US" smtClean="0"/>
-              <a:t>3/21/2022</a:t>
+              <a:t>3/26/2022</a:t>
             </a:fld>
             <a:endParaRPr lang="en-US"/>
           </a:p>
@@ -11586,7 +11586,7 @@
           <a:p>
             <a:fld id="{734BCCD4-CEB1-405B-A443-DD9CBCBEA552}" type="datetime1">
               <a:rPr lang="en-US" smtClean="0"/>
-              <a:t>3/21/2022</a:t>
+              <a:t>3/26/2022</a:t>
             </a:fld>
             <a:endParaRPr lang="en-US"/>
           </a:p>
@@ -12207,7 +12207,7 @@
         </p:blipFill>
         <p:spPr>
           <a:xfrm>
-            <a:off x="-2" y="-4"/>
+            <a:off x="-1" y="-2"/>
             <a:ext cx="12192001" cy="6858001"/>
           </a:xfrm>
           <a:prstGeom prst="rect">
@@ -12254,15 +12254,22 @@
                   <a:srgbClr val="FFFFFF"/>
                 </a:solidFill>
               </a:rPr>
-              <a:t>백준 암호 만들기</a:t>
-            </a:r>
-            <a:r>
+              <a:t>두 배열의 원소 교체</a:t>
+            </a:r>
+            <a:br>
               <a:rPr lang="en-US" altLang="ko-KR" sz="3000" dirty="0">
                 <a:solidFill>
                   <a:srgbClr val="FFFFFF"/>
                 </a:solidFill>
               </a:rPr>
-              <a:t>(1759</a:t>
+            </a:br>
+            <a:r>
+              <a:rPr lang="en-US" altLang="ko-KR" sz="3000" dirty="0">
+                <a:solidFill>
+                  <a:srgbClr val="FFFFFF"/>
+                </a:solidFill>
+              </a:rPr>
+              <a:t>(</a:t>
             </a:r>
             <a:r>
               <a:rPr lang="ko-KR" altLang="en-US" sz="3000" dirty="0">
@@ -12270,7 +12277,7 @@
                   <a:srgbClr val="FFFFFF"/>
                 </a:solidFill>
               </a:rPr>
-              <a:t>번</a:t>
+              <a:t>합 최대값 만들기</a:t>
             </a:r>
             <a:r>
               <a:rPr lang="en-US" altLang="ko-KR" sz="3000" dirty="0">
@@ -12278,16 +12285,13 @@
                   <a:srgbClr val="FFFFFF"/>
                 </a:solidFill>
               </a:rPr>
-              <a:t>)_</a:t>
-            </a:r>
-            <a:r>
-              <a:rPr lang="ko-KR" altLang="en-US" sz="3000" dirty="0">
-                <a:solidFill>
-                  <a:srgbClr val="FFFFFF"/>
-                </a:solidFill>
-              </a:rPr>
-              <a:t>백트래킹</a:t>
-            </a:r>
+              <a:t>)</a:t>
+            </a:r>
+            <a:endParaRPr lang="ko-KR" altLang="en-US" sz="3000" dirty="0">
+              <a:solidFill>
+                <a:srgbClr val="FFFFFF"/>
+              </a:solidFill>
+            </a:endParaRPr>
           </a:p>
         </p:txBody>
       </p:sp>
@@ -12414,6 +12418,53 @@
           <a:p>
             <a:pPr algn="ctr"/>
             <a:endParaRPr lang="en-US"/>
+          </a:p>
+        </p:txBody>
+      </p:sp>
+      <p:sp>
+        <p:nvSpPr>
+          <p:cNvPr id="3" name="TextBox 2">
+            <a:extLst>
+              <a:ext uri="{FF2B5EF4-FFF2-40B4-BE49-F238E27FC236}">
+                <a16:creationId xmlns:a16="http://schemas.microsoft.com/office/drawing/2014/main" id="{4DEDF533-18E0-488B-ACBC-1E37316B25DC}"/>
+              </a:ext>
+            </a:extLst>
+          </p:cNvPr>
+          <p:cNvSpPr txBox="1"/>
+          <p:nvPr/>
+        </p:nvSpPr>
+        <p:spPr>
+          <a:xfrm>
+            <a:off x="9271001" y="5701647"/>
+            <a:ext cx="1693018" cy="369332"/>
+          </a:xfrm>
+          <a:prstGeom prst="rect">
+            <a:avLst/>
+          </a:prstGeom>
+          <a:noFill/>
+        </p:spPr>
+        <p:txBody>
+          <a:bodyPr wrap="square" rtlCol="0">
+            <a:spAutoFit/>
+          </a:bodyPr>
+          <a:lstStyle/>
+          <a:p>
+            <a:r>
+              <a:rPr lang="en-US" altLang="ko-KR" dirty="0">
+                <a:solidFill>
+                  <a:schemeClr val="bg1"/>
+                </a:solidFill>
+              </a:rPr>
+              <a:t>1</a:t>
+            </a:r>
+            <a:r>
+              <a:rPr lang="ko-KR" altLang="en-US" dirty="0">
+                <a:solidFill>
+                  <a:schemeClr val="bg1"/>
+                </a:solidFill>
+              </a:rPr>
+              <a:t>조 이수민</a:t>
+            </a:r>
           </a:p>
         </p:txBody>
       </p:sp>
@@ -13901,8 +13952,8 @@
           </a:prstGeom>
         </p:spPr>
       </p:pic>
-      <mc:AlternateContent xmlns:mc="http://schemas.openxmlformats.org/markup-compatibility/2006">
-        <mc:Choice xmlns:p14="http://schemas.microsoft.com/office/powerpoint/2010/main" Requires="p14">
+      <mc:AlternateContent xmlns:mc="http://schemas.openxmlformats.org/markup-compatibility/2006" xmlns:p14="http://schemas.microsoft.com/office/powerpoint/2010/main">
+        <mc:Choice Requires="p14">
           <p:contentPart p14:bwMode="auto" r:id="rId4">
             <p14:nvContentPartPr>
               <p14:cNvPr id="3" name="잉크 2">
@@ -13921,7 +13972,7 @@
             </p14:xfrm>
           </p:contentPart>
         </mc:Choice>
-        <mc:Fallback>
+        <mc:Fallback xmlns="">
           <p:pic>
             <p:nvPicPr>
               <p:cNvPr id="3" name="잉크 2">
@@ -13952,8 +14003,8 @@
           </p:pic>
         </mc:Fallback>
       </mc:AlternateContent>
-      <mc:AlternateContent xmlns:mc="http://schemas.openxmlformats.org/markup-compatibility/2006">
-        <mc:Choice xmlns:p14="http://schemas.microsoft.com/office/powerpoint/2010/main" Requires="p14">
+      <mc:AlternateContent xmlns:mc="http://schemas.openxmlformats.org/markup-compatibility/2006" xmlns:p14="http://schemas.microsoft.com/office/powerpoint/2010/main">
+        <mc:Choice Requires="p14">
           <p:contentPart p14:bwMode="auto" r:id="rId6">
             <p14:nvContentPartPr>
               <p14:cNvPr id="7" name="잉크 6">
@@ -13972,7 +14023,7 @@
             </p14:xfrm>
           </p:contentPart>
         </mc:Choice>
-        <mc:Fallback>
+        <mc:Fallback xmlns="">
           <p:pic>
             <p:nvPicPr>
               <p:cNvPr id="7" name="잉크 6">
@@ -14003,8 +14054,8 @@
           </p:pic>
         </mc:Fallback>
       </mc:AlternateContent>
-      <mc:AlternateContent xmlns:mc="http://schemas.openxmlformats.org/markup-compatibility/2006">
-        <mc:Choice xmlns:p14="http://schemas.microsoft.com/office/powerpoint/2010/main" Requires="p14">
+      <mc:AlternateContent xmlns:mc="http://schemas.openxmlformats.org/markup-compatibility/2006" xmlns:p14="http://schemas.microsoft.com/office/powerpoint/2010/main">
+        <mc:Choice Requires="p14">
           <p:contentPart p14:bwMode="auto" r:id="rId8">
             <p14:nvContentPartPr>
               <p14:cNvPr id="14" name="잉크 13">
@@ -14023,7 +14074,7 @@
             </p14:xfrm>
           </p:contentPart>
         </mc:Choice>
-        <mc:Fallback>
+        <mc:Fallback xmlns="">
           <p:pic>
             <p:nvPicPr>
               <p:cNvPr id="14" name="잉크 13">
@@ -14054,8 +14105,8 @@
           </p:pic>
         </mc:Fallback>
       </mc:AlternateContent>
-      <mc:AlternateContent xmlns:mc="http://schemas.openxmlformats.org/markup-compatibility/2006">
-        <mc:Choice xmlns:p14="http://schemas.microsoft.com/office/powerpoint/2010/main" Requires="p14">
+      <mc:AlternateContent xmlns:mc="http://schemas.openxmlformats.org/markup-compatibility/2006" xmlns:p14="http://schemas.microsoft.com/office/powerpoint/2010/main">
+        <mc:Choice Requires="p14">
           <p:contentPart p14:bwMode="auto" r:id="rId10">
             <p14:nvContentPartPr>
               <p14:cNvPr id="15" name="잉크 14">
@@ -14074,7 +14125,7 @@
             </p14:xfrm>
           </p:contentPart>
         </mc:Choice>
-        <mc:Fallback>
+        <mc:Fallback xmlns="">
           <p:pic>
             <p:nvPicPr>
               <p:cNvPr id="15" name="잉크 14">
@@ -14105,8 +14156,8 @@
           </p:pic>
         </mc:Fallback>
       </mc:AlternateContent>
-      <mc:AlternateContent xmlns:mc="http://schemas.openxmlformats.org/markup-compatibility/2006">
-        <mc:Choice xmlns:p14="http://schemas.microsoft.com/office/powerpoint/2010/main" Requires="p14">
+      <mc:AlternateContent xmlns:mc="http://schemas.openxmlformats.org/markup-compatibility/2006" xmlns:p14="http://schemas.microsoft.com/office/powerpoint/2010/main">
+        <mc:Choice Requires="p14">
           <p:contentPart p14:bwMode="auto" r:id="rId12">
             <p14:nvContentPartPr>
               <p14:cNvPr id="16" name="잉크 15">
@@ -14125,7 +14176,7 @@
             </p14:xfrm>
           </p:contentPart>
         </mc:Choice>
-        <mc:Fallback>
+        <mc:Fallback xmlns="">
           <p:pic>
             <p:nvPicPr>
               <p:cNvPr id="16" name="잉크 15">

</xml_diff>